<commit_message>
Modified Slides of individual use cases
Added the links of the research papers relevant to use cases
</commit_message>
<xml_diff>
--- a/Humana-ML-Case Studies.pptx
+++ b/Humana-ML-Case Studies.pptx
@@ -6,7 +6,7 @@
     <p:sldMasterId id="2147483660" r:id="rId2"/>
   </p:sldMasterIdLst>
   <p:notesMasterIdLst>
-    <p:notesMasterId r:id="rId16"/>
+    <p:notesMasterId r:id="rId20"/>
   </p:notesMasterIdLst>
   <p:sldIdLst>
     <p:sldId id="257" r:id="rId3"/>
@@ -17,11 +17,15 @@
     <p:sldId id="415" r:id="rId8"/>
     <p:sldId id="416" r:id="rId9"/>
     <p:sldId id="417" r:id="rId10"/>
-    <p:sldId id="418" r:id="rId11"/>
-    <p:sldId id="419" r:id="rId12"/>
-    <p:sldId id="420" r:id="rId13"/>
-    <p:sldId id="421" r:id="rId14"/>
-    <p:sldId id="396" r:id="rId15"/>
+    <p:sldId id="422" r:id="rId11"/>
+    <p:sldId id="423" r:id="rId12"/>
+    <p:sldId id="424" r:id="rId13"/>
+    <p:sldId id="418" r:id="rId14"/>
+    <p:sldId id="425" r:id="rId15"/>
+    <p:sldId id="419" r:id="rId16"/>
+    <p:sldId id="420" r:id="rId17"/>
+    <p:sldId id="421" r:id="rId18"/>
+    <p:sldId id="396" r:id="rId19"/>
   </p:sldIdLst>
   <p:sldSz cx="9144000" cy="6858000" type="screen4x3"/>
   <p:notesSz cx="6858000" cy="9144000"/>
@@ -7346,28 +7350,129 @@
           <a:lstStyle/>
           <a:p>
             <a:r>
+              <a:rPr lang="en-US" b="1" dirty="0" smtClean="0"/>
+              <a:t>Statistical </a:t>
+            </a:r>
+            <a:r>
+              <a:rPr lang="en-US" b="1" dirty="0"/>
+              <a:t>healthcare fraud detection </a:t>
+            </a:r>
+            <a:r>
+              <a:rPr lang="en-US" b="1" dirty="0" smtClean="0"/>
+              <a:t>techniques</a:t>
+            </a:r>
+            <a:endParaRPr lang="en-US" dirty="0"/>
+          </a:p>
+        </p:txBody>
+      </p:sp>
+      <p:sp>
+        <p:nvSpPr>
+          <p:cNvPr id="3" name="Content Placeholder 2"/>
+          <p:cNvSpPr>
+            <a:spLocks noGrp="1"/>
+          </p:cNvSpPr>
+          <p:nvPr>
+            <p:ph idx="1"/>
+          </p:nvPr>
+        </p:nvSpPr>
+        <p:spPr/>
+        <p:txBody>
+          <a:bodyPr>
+            <a:normAutofit fontScale="92500" lnSpcReduction="10000"/>
+          </a:bodyPr>
+          <a:lstStyle/>
+          <a:p>
+            <a:r>
+              <a:rPr lang="en-US" dirty="0"/>
+              <a:t>Total amount </a:t>
+            </a:r>
+            <a:r>
               <a:rPr lang="en-US" dirty="0" smtClean="0"/>
-              <a:t>Use Case 5- Provider/Sales Agent Performance Prediction</a:t>
+              <a:t>billed</a:t>
             </a:r>
             <a:endParaRPr lang="en-US" dirty="0"/>
           </a:p>
-        </p:txBody>
-      </p:sp>
-      <p:sp>
-        <p:nvSpPr>
-          <p:cNvPr id="3" name="Content Placeholder 2"/>
-          <p:cNvSpPr>
-            <a:spLocks noGrp="1"/>
-          </p:cNvSpPr>
-          <p:nvPr>
-            <p:ph idx="1"/>
-          </p:nvPr>
-        </p:nvSpPr>
-        <p:spPr/>
-        <p:txBody>
-          <a:bodyPr/>
-          <a:lstStyle/>
-          <a:p>
+          <a:p>
+            <a:r>
+              <a:rPr lang="en-US" dirty="0"/>
+              <a:t>Total number of </a:t>
+            </a:r>
+            <a:r>
+              <a:rPr lang="en-US" dirty="0" smtClean="0"/>
+              <a:t>patients</a:t>
+            </a:r>
+            <a:endParaRPr lang="en-US" dirty="0"/>
+          </a:p>
+          <a:p>
+            <a:r>
+              <a:rPr lang="en-US" dirty="0"/>
+              <a:t>Total number of patient </a:t>
+            </a:r>
+            <a:r>
+              <a:rPr lang="en-US" dirty="0" smtClean="0"/>
+              <a:t>visits</a:t>
+            </a:r>
+            <a:endParaRPr lang="en-US" dirty="0"/>
+          </a:p>
+          <a:p>
+            <a:r>
+              <a:rPr lang="en-US" dirty="0"/>
+              <a:t>Per-patient average billing </a:t>
+            </a:r>
+            <a:r>
+              <a:rPr lang="en-US" dirty="0" smtClean="0"/>
+              <a:t>amounts</a:t>
+            </a:r>
+            <a:endParaRPr lang="en-US" dirty="0"/>
+          </a:p>
+          <a:p>
+            <a:r>
+              <a:rPr lang="en-US" dirty="0"/>
+              <a:t>Per-patient average visit </a:t>
+            </a:r>
+            <a:r>
+              <a:rPr lang="en-US" dirty="0" smtClean="0"/>
+              <a:t>numbers</a:t>
+            </a:r>
+            <a:endParaRPr lang="en-US" dirty="0"/>
+          </a:p>
+          <a:p>
+            <a:r>
+              <a:rPr lang="en-US" dirty="0"/>
+              <a:t>Per-patient average medical </a:t>
+            </a:r>
+            <a:r>
+              <a:rPr lang="en-US" dirty="0" smtClean="0"/>
+              <a:t>tests</a:t>
+            </a:r>
+            <a:endParaRPr lang="en-US" dirty="0"/>
+          </a:p>
+          <a:p>
+            <a:r>
+              <a:rPr lang="en-US" dirty="0"/>
+              <a:t>Per-patient average medical test </a:t>
+            </a:r>
+            <a:r>
+              <a:rPr lang="en-US" dirty="0" smtClean="0"/>
+              <a:t>costs</a:t>
+            </a:r>
+            <a:endParaRPr lang="en-US" dirty="0"/>
+          </a:p>
+          <a:p>
+            <a:r>
+              <a:rPr lang="en-US" dirty="0"/>
+              <a:t>Per-patient average prescription ratios (of specially monitored drugs</a:t>
+            </a:r>
+            <a:r>
+              <a:rPr lang="en-US" dirty="0" smtClean="0"/>
+              <a:t>)</a:t>
+            </a:r>
+            <a:endParaRPr lang="en-US" dirty="0"/>
+          </a:p>
+          <a:p>
+            <a:pPr marL="0" indent="0">
+              <a:buNone/>
+            </a:pPr>
             <a:endParaRPr lang="en-US" dirty="0"/>
           </a:p>
         </p:txBody>
@@ -7421,7 +7526,7 @@
     </p:spTree>
     <p:extLst>
       <p:ext uri="{BB962C8B-B14F-4D97-AF65-F5344CB8AC3E}">
-        <p14:creationId xmlns:p14="http://schemas.microsoft.com/office/powerpoint/2010/main" val="3244001641"/>
+        <p14:creationId xmlns:p14="http://schemas.microsoft.com/office/powerpoint/2010/main" val="3154350029"/>
       </p:ext>
     </p:extLst>
   </p:cSld>
@@ -7460,37 +7565,111 @@
         </p:nvSpPr>
         <p:spPr/>
         <p:txBody>
+          <a:bodyPr/>
+          <a:lstStyle/>
+          <a:p>
+            <a:r>
+              <a:rPr lang="en-US" dirty="0" smtClean="0"/>
+              <a:t>What we can do?</a:t>
+            </a:r>
+            <a:endParaRPr lang="en-US" dirty="0"/>
+          </a:p>
+        </p:txBody>
+      </p:sp>
+      <p:sp>
+        <p:nvSpPr>
+          <p:cNvPr id="3" name="Content Placeholder 2"/>
+          <p:cNvSpPr>
+            <a:spLocks noGrp="1"/>
+          </p:cNvSpPr>
+          <p:nvPr>
+            <p:ph idx="1"/>
+          </p:nvPr>
+        </p:nvSpPr>
+        <p:spPr/>
+        <p:txBody>
           <a:bodyPr>
-            <a:normAutofit/>
+            <a:normAutofit fontScale="77500" lnSpcReduction="20000"/>
           </a:bodyPr>
           <a:lstStyle/>
           <a:p>
             <a:r>
               <a:rPr lang="en-US" dirty="0" smtClean="0"/>
-              <a:t>Use Case 6- Market Segmentation</a:t>
-            </a:r>
-            <a:endParaRPr lang="en-US" dirty="0"/>
-          </a:p>
-        </p:txBody>
-      </p:sp>
-      <p:sp>
-        <p:nvSpPr>
-          <p:cNvPr id="3" name="Content Placeholder 2"/>
-          <p:cNvSpPr>
-            <a:spLocks noGrp="1"/>
-          </p:cNvSpPr>
-          <p:nvPr>
-            <p:ph idx="1"/>
-          </p:nvPr>
-        </p:nvSpPr>
-        <p:spPr/>
-        <p:txBody>
-          <a:bodyPr/>
-          <a:lstStyle/>
-          <a:p>
+              <a:t>Develop Predictive </a:t>
+            </a:r>
+            <a:r>
+              <a:rPr lang="en-US" dirty="0"/>
+              <a:t>models </a:t>
+            </a:r>
             <a:r>
               <a:rPr lang="en-US" dirty="0" smtClean="0"/>
-              <a:t>Cluster sales of various medical plans demographically</a:t>
+              <a:t>that can </a:t>
+            </a:r>
+            <a:r>
+              <a:rPr lang="en-US" dirty="0"/>
+              <a:t>predict potential fraudulent claims and providers. </a:t>
+            </a:r>
+            <a:endParaRPr lang="en-US" dirty="0" smtClean="0"/>
+          </a:p>
+          <a:p>
+            <a:r>
+              <a:rPr lang="en-US" dirty="0" smtClean="0"/>
+              <a:t>Problem:</a:t>
+            </a:r>
+            <a:r>
+              <a:rPr lang="en-US" dirty="0"/>
+              <a:t> </a:t>
+            </a:r>
+            <a:r>
+              <a:rPr lang="en-US" dirty="0" smtClean="0"/>
+              <a:t>Difficult to </a:t>
+            </a:r>
+            <a:r>
+              <a:rPr lang="en-US" dirty="0"/>
+              <a:t>obtain training historical data as most fraudulent claims may have not been discovered!</a:t>
+            </a:r>
+          </a:p>
+          <a:p>
+            <a:r>
+              <a:rPr lang="en-US" dirty="0" smtClean="0"/>
+              <a:t>Predictive </a:t>
+            </a:r>
+            <a:r>
+              <a:rPr lang="en-US" dirty="0"/>
+              <a:t>modeling </a:t>
+            </a:r>
+            <a:r>
+              <a:rPr lang="en-US" dirty="0" smtClean="0"/>
+              <a:t>tips: </a:t>
+            </a:r>
+          </a:p>
+          <a:p>
+            <a:pPr lvl="1"/>
+            <a:r>
+              <a:rPr lang="en-US" dirty="0" smtClean="0"/>
+              <a:t>Large neural networks with a large number of input and hidden nodes lead to </a:t>
+            </a:r>
+            <a:r>
+              <a:rPr lang="en-US" i="1" dirty="0" smtClean="0"/>
+              <a:t>overfitting</a:t>
+            </a:r>
+            <a:r>
+              <a:rPr lang="en-US" dirty="0" smtClean="0"/>
+              <a:t>. </a:t>
+            </a:r>
+          </a:p>
+          <a:p>
+            <a:pPr lvl="1"/>
+            <a:r>
+              <a:rPr lang="en-US" dirty="0" smtClean="0"/>
+              <a:t>Large networks, especially with small training datasets, can remember individual records. This is no good predictive model. </a:t>
+            </a:r>
+          </a:p>
+          <a:p>
+            <a:pPr lvl="1"/>
+            <a:r>
+              <a:rPr lang="en-US" dirty="0" smtClean="0"/>
+              <a:t>A better way is to decompose problems into multiple smaller neural networks with a small number of input and hidden layer nodes, each network predicting one type of frauds. </a:t>
             </a:r>
             <a:endParaRPr lang="en-US" dirty="0"/>
           </a:p>
@@ -7545,7 +7724,7 @@
     </p:spTree>
     <p:extLst>
       <p:ext uri="{BB962C8B-B14F-4D97-AF65-F5344CB8AC3E}">
-        <p14:creationId xmlns:p14="http://schemas.microsoft.com/office/powerpoint/2010/main" val="820873880"/>
+        <p14:creationId xmlns:p14="http://schemas.microsoft.com/office/powerpoint/2010/main" val="936476350"/>
       </p:ext>
     </p:extLst>
   </p:cSld>
@@ -7585,128 +7764,125 @@
         <p:spPr/>
         <p:txBody>
           <a:bodyPr>
-            <a:normAutofit fontScale="90000"/>
+            <a:normAutofit/>
           </a:bodyPr>
           <a:lstStyle/>
           <a:p>
             <a:r>
-              <a:rPr lang="en-US" sz="3600" b="1" dirty="0"/>
-              <a:t>15 AI Applications / </a:t>
-            </a:r>
-            <a:r>
-              <a:rPr lang="en-US" sz="3600" b="1" dirty="0" err="1"/>
-              <a:t>Usecases</a:t>
-            </a:r>
-            <a:r>
-              <a:rPr lang="en-US" sz="3600" b="1" dirty="0"/>
-              <a:t> in Healthcare [2018 update</a:t>
-            </a:r>
-            <a:r>
-              <a:rPr lang="en-US" sz="3600" b="1" dirty="0" smtClean="0"/>
-              <a:t>]</a:t>
-            </a:r>
-            <a:r>
-              <a:rPr lang="en-US" sz="3600" b="1" dirty="0"/>
-              <a:t/>
-            </a:r>
-            <a:br>
-              <a:rPr lang="en-US" sz="3600" b="1" dirty="0"/>
-            </a:br>
-            <a:r>
-              <a:rPr lang="en-US" sz="1700" b="1" dirty="0"/>
-              <a:t>Source-https://blog.appliedai.com/healthcare-</a:t>
-            </a:r>
-            <a:r>
-              <a:rPr lang="en-US" sz="1700" b="1" dirty="0" err="1"/>
-              <a:t>ai</a:t>
-            </a:r>
-            <a:r>
-              <a:rPr lang="en-US" sz="1700" b="1" dirty="0"/>
-              <a:t>/</a:t>
-            </a:r>
-            <a:endParaRPr lang="en-US" sz="1700" dirty="0"/>
+              <a:rPr lang="en-US" dirty="0" smtClean="0"/>
+              <a:t>Use Case 4- Claim Price Prediction</a:t>
+            </a:r>
+            <a:endParaRPr lang="en-US" dirty="0"/>
+          </a:p>
+        </p:txBody>
+      </p:sp>
+      <p:sp>
+        <p:nvSpPr>
+          <p:cNvPr id="3" name="Content Placeholder 2"/>
+          <p:cNvSpPr>
+            <a:spLocks noGrp="1"/>
+          </p:cNvSpPr>
+          <p:nvPr>
+            <p:ph idx="1"/>
+          </p:nvPr>
+        </p:nvSpPr>
+        <p:spPr/>
+        <p:txBody>
+          <a:bodyPr/>
+          <a:lstStyle/>
+          <a:p>
+            <a:r>
+              <a:rPr lang="en-US" dirty="0" smtClean="0"/>
+              <a:t>Predict medical claim price based on Procedure code and Diagnosis code</a:t>
+            </a:r>
+          </a:p>
+          <a:p>
+            <a:r>
+              <a:rPr lang="en-US" dirty="0" smtClean="0"/>
+              <a:t>Obtain data from </a:t>
+            </a:r>
+            <a:r>
+              <a:rPr lang="en-US" dirty="0"/>
+              <a:t>United States’ Centers for Medicare &amp; Medicaid Services (CMS) website</a:t>
+            </a:r>
+            <a:endParaRPr lang="en-US" dirty="0"/>
+          </a:p>
+        </p:txBody>
+      </p:sp>
+      <p:sp>
+        <p:nvSpPr>
+          <p:cNvPr id="4" name="Footer Placeholder 3"/>
+          <p:cNvSpPr>
+            <a:spLocks noGrp="1"/>
+          </p:cNvSpPr>
+          <p:nvPr>
+            <p:ph type="ftr" sz="quarter" idx="11"/>
+          </p:nvPr>
+        </p:nvSpPr>
+        <p:spPr/>
+        <p:txBody>
+          <a:bodyPr/>
+          <a:lstStyle/>
+          <a:p>
+            <a:r>
+              <a:rPr lang="en-US" smtClean="0"/>
+              <a:t>(c) Pratik Shirbhate- Big data and data Science</a:t>
+            </a:r>
+            <a:endParaRPr lang="en-US"/>
+          </a:p>
+        </p:txBody>
+      </p:sp>
+      <p:sp>
+        <p:nvSpPr>
+          <p:cNvPr id="5" name="Slide Number Placeholder 4"/>
+          <p:cNvSpPr>
+            <a:spLocks noGrp="1"/>
+          </p:cNvSpPr>
+          <p:nvPr>
+            <p:ph type="sldNum" sz="quarter" idx="12"/>
+          </p:nvPr>
+        </p:nvSpPr>
+        <p:spPr/>
+        <p:txBody>
+          <a:bodyPr/>
+          <a:lstStyle/>
+          <a:p>
+            <a:fld id="{8CDFFFFD-3B3E-4576-A5F0-2FC5AA489A90}" type="slidenum">
+              <a:rPr lang="en-US" smtClean="0"/>
+              <a:t>12</a:t>
+            </a:fld>
+            <a:endParaRPr lang="en-US"/>
           </a:p>
         </p:txBody>
       </p:sp>
       <p:pic>
         <p:nvPicPr>
-          <p:cNvPr id="6" name="Content Placeholder 5"/>
+          <p:cNvPr id="8" name="Picture 7"/>
           <p:cNvPicPr>
-            <a:picLocks noGrp="1" noChangeAspect="1"/>
+            <a:picLocks noChangeAspect="1"/>
           </p:cNvPicPr>
-          <p:nvPr>
-            <p:ph idx="1"/>
-          </p:nvPr>
+          <p:nvPr/>
         </p:nvPicPr>
         <p:blipFill>
-          <a:blip r:embed="rId2" cstate="print">
-            <a:extLst>
-              <a:ext uri="{28A0092B-C50C-407E-A947-70E740481C1C}">
-                <a14:useLocalDpi xmlns:a14="http://schemas.microsoft.com/office/drawing/2010/main" val="0"/>
-              </a:ext>
-            </a:extLst>
-          </a:blip>
+          <a:blip r:embed="rId2"/>
           <a:stretch>
             <a:fillRect/>
           </a:stretch>
         </p:blipFill>
         <p:spPr>
           <a:xfrm>
-            <a:off x="862979" y="1624012"/>
-            <a:ext cx="7418042" cy="4525963"/>
+            <a:off x="723900" y="3863181"/>
+            <a:ext cx="7696200" cy="2807270"/>
           </a:xfrm>
+          <a:prstGeom prst="rect">
+            <a:avLst/>
+          </a:prstGeom>
         </p:spPr>
       </p:pic>
-      <p:sp>
-        <p:nvSpPr>
-          <p:cNvPr id="4" name="Footer Placeholder 3"/>
-          <p:cNvSpPr>
-            <a:spLocks noGrp="1"/>
-          </p:cNvSpPr>
-          <p:nvPr>
-            <p:ph type="ftr" sz="quarter" idx="11"/>
-          </p:nvPr>
-        </p:nvSpPr>
-        <p:spPr/>
-        <p:txBody>
-          <a:bodyPr/>
-          <a:lstStyle/>
-          <a:p>
-            <a:r>
-              <a:rPr lang="en-US" smtClean="0"/>
-              <a:t>(c) Pratik Shirbhate- Big data and data Science</a:t>
-            </a:r>
-            <a:endParaRPr lang="en-US"/>
-          </a:p>
-        </p:txBody>
-      </p:sp>
-      <p:sp>
-        <p:nvSpPr>
-          <p:cNvPr id="5" name="Slide Number Placeholder 4"/>
-          <p:cNvSpPr>
-            <a:spLocks noGrp="1"/>
-          </p:cNvSpPr>
-          <p:nvPr>
-            <p:ph type="sldNum" sz="quarter" idx="12"/>
-          </p:nvPr>
-        </p:nvSpPr>
-        <p:spPr/>
-        <p:txBody>
-          <a:bodyPr/>
-          <a:lstStyle/>
-          <a:p>
-            <a:fld id="{8CDFFFFD-3B3E-4576-A5F0-2FC5AA489A90}" type="slidenum">
-              <a:rPr lang="en-US" smtClean="0"/>
-              <a:t>12</a:t>
-            </a:fld>
-            <a:endParaRPr lang="en-US"/>
-          </a:p>
-        </p:txBody>
-      </p:sp>
     </p:spTree>
     <p:extLst>
       <p:ext uri="{BB962C8B-B14F-4D97-AF65-F5344CB8AC3E}">
-        <p14:creationId xmlns:p14="http://schemas.microsoft.com/office/powerpoint/2010/main" val="2022144738"/>
+        <p14:creationId xmlns:p14="http://schemas.microsoft.com/office/powerpoint/2010/main" val="1372200419"/>
       </p:ext>
     </p:extLst>
   </p:cSld>
@@ -7735,12 +7911,309 @@
       </p:grpSpPr>
       <p:sp>
         <p:nvSpPr>
+          <p:cNvPr id="2" name="Title 1"/>
+          <p:cNvSpPr>
+            <a:spLocks noGrp="1"/>
+          </p:cNvSpPr>
+          <p:nvPr>
+            <p:ph type="title"/>
+          </p:nvPr>
+        </p:nvSpPr>
+        <p:spPr/>
+        <p:txBody>
+          <a:bodyPr/>
+          <a:lstStyle/>
+          <a:p>
+            <a:r>
+              <a:rPr lang="en-US" dirty="0" smtClean="0"/>
+              <a:t>Research Paper</a:t>
+            </a:r>
+            <a:endParaRPr lang="en-US" dirty="0"/>
+          </a:p>
+        </p:txBody>
+      </p:sp>
+      <p:sp>
+        <p:nvSpPr>
           <p:cNvPr id="3" name="Content Placeholder 2"/>
           <p:cNvSpPr>
             <a:spLocks noGrp="1"/>
           </p:cNvSpPr>
           <p:nvPr>
             <p:ph idx="1"/>
+          </p:nvPr>
+        </p:nvSpPr>
+        <p:spPr/>
+        <p:txBody>
+          <a:bodyPr/>
+          <a:lstStyle/>
+          <a:p>
+            <a:r>
+              <a:rPr lang="en-US" dirty="0">
+                <a:hlinkClick r:id="rId2"/>
+              </a:rPr>
+              <a:t>Analyzing health insurance claims on different timescales to predict days in hospital</a:t>
+            </a:r>
+            <a:endParaRPr lang="en-US" dirty="0"/>
+          </a:p>
+          <a:p>
+            <a:r>
+              <a:rPr lang="en-US" dirty="0">
+                <a:hlinkClick r:id="rId3"/>
+              </a:rPr>
+              <a:t>Algorithmic Prediction of Health-Care </a:t>
+            </a:r>
+            <a:r>
+              <a:rPr lang="en-US" dirty="0" smtClean="0">
+                <a:hlinkClick r:id="rId3"/>
+              </a:rPr>
+              <a:t>Costs</a:t>
+            </a:r>
+            <a:endParaRPr lang="en-US" dirty="0" smtClean="0"/>
+          </a:p>
+          <a:p>
+            <a:r>
+              <a:rPr lang="en-US" dirty="0">
+                <a:hlinkClick r:id="rId4"/>
+              </a:rPr>
+              <a:t>Data Mining to Predict and Prevent Errors in Health Insurance Claims Processing</a:t>
+            </a:r>
+            <a:endParaRPr lang="en-US" dirty="0"/>
+          </a:p>
+        </p:txBody>
+      </p:sp>
+      <p:sp>
+        <p:nvSpPr>
+          <p:cNvPr id="4" name="Footer Placeholder 3"/>
+          <p:cNvSpPr>
+            <a:spLocks noGrp="1"/>
+          </p:cNvSpPr>
+          <p:nvPr>
+            <p:ph type="ftr" sz="quarter" idx="11"/>
+          </p:nvPr>
+        </p:nvSpPr>
+        <p:spPr/>
+        <p:txBody>
+          <a:bodyPr/>
+          <a:lstStyle/>
+          <a:p>
+            <a:r>
+              <a:rPr lang="en-US" smtClean="0"/>
+              <a:t>(c) Pratik Shirbhate- Big data and data Science</a:t>
+            </a:r>
+            <a:endParaRPr lang="en-US"/>
+          </a:p>
+        </p:txBody>
+      </p:sp>
+      <p:sp>
+        <p:nvSpPr>
+          <p:cNvPr id="5" name="Slide Number Placeholder 4"/>
+          <p:cNvSpPr>
+            <a:spLocks noGrp="1"/>
+          </p:cNvSpPr>
+          <p:nvPr>
+            <p:ph type="sldNum" sz="quarter" idx="12"/>
+          </p:nvPr>
+        </p:nvSpPr>
+        <p:spPr/>
+        <p:txBody>
+          <a:bodyPr/>
+          <a:lstStyle/>
+          <a:p>
+            <a:fld id="{8CDFFFFD-3B3E-4576-A5F0-2FC5AA489A90}" type="slidenum">
+              <a:rPr lang="en-US" smtClean="0"/>
+              <a:t>13</a:t>
+            </a:fld>
+            <a:endParaRPr lang="en-US"/>
+          </a:p>
+        </p:txBody>
+      </p:sp>
+    </p:spTree>
+    <p:extLst>
+      <p:ext uri="{BB962C8B-B14F-4D97-AF65-F5344CB8AC3E}">
+        <p14:creationId xmlns:p14="http://schemas.microsoft.com/office/powerpoint/2010/main" val="1455648629"/>
+      </p:ext>
+    </p:extLst>
+  </p:cSld>
+  <p:clrMapOvr>
+    <a:masterClrMapping/>
+  </p:clrMapOvr>
+</p:sld>
+</file>
+
+<file path=ppt/slides/slide14.xml><?xml version="1.0" encoding="utf-8"?>
+<p:sld xmlns:a="http://schemas.openxmlformats.org/drawingml/2006/main" xmlns:r="http://schemas.openxmlformats.org/officeDocument/2006/relationships" xmlns:p="http://schemas.openxmlformats.org/presentationml/2006/main">
+  <p:cSld>
+    <p:spTree>
+      <p:nvGrpSpPr>
+        <p:cNvPr id="1" name=""/>
+        <p:cNvGrpSpPr/>
+        <p:nvPr/>
+      </p:nvGrpSpPr>
+      <p:grpSpPr>
+        <a:xfrm>
+          <a:off x="0" y="0"/>
+          <a:ext cx="0" cy="0"/>
+          <a:chOff x="0" y="0"/>
+          <a:chExt cx="0" cy="0"/>
+        </a:xfrm>
+      </p:grpSpPr>
+      <p:sp>
+        <p:nvSpPr>
+          <p:cNvPr id="2" name="Title 1"/>
+          <p:cNvSpPr>
+            <a:spLocks noGrp="1"/>
+          </p:cNvSpPr>
+          <p:nvPr>
+            <p:ph type="title"/>
+          </p:nvPr>
+        </p:nvSpPr>
+        <p:spPr/>
+        <p:txBody>
+          <a:bodyPr>
+            <a:normAutofit fontScale="90000"/>
+          </a:bodyPr>
+          <a:lstStyle/>
+          <a:p>
+            <a:r>
+              <a:rPr lang="en-US" dirty="0" smtClean="0"/>
+              <a:t>Use Case 5- Provider/Sales Agent Performance Prediction</a:t>
+            </a:r>
+            <a:endParaRPr lang="en-US" dirty="0"/>
+          </a:p>
+        </p:txBody>
+      </p:sp>
+      <p:sp>
+        <p:nvSpPr>
+          <p:cNvPr id="3" name="Content Placeholder 2"/>
+          <p:cNvSpPr>
+            <a:spLocks noGrp="1"/>
+          </p:cNvSpPr>
+          <p:nvPr>
+            <p:ph idx="1"/>
+          </p:nvPr>
+        </p:nvSpPr>
+        <p:spPr/>
+        <p:txBody>
+          <a:bodyPr/>
+          <a:lstStyle/>
+          <a:p>
+            <a:r>
+              <a:rPr lang="en-US" dirty="0" smtClean="0"/>
+              <a:t>Obtain Sales data--- data extract of IDV/ any other agent tool</a:t>
+            </a:r>
+          </a:p>
+          <a:p>
+            <a:r>
+              <a:rPr lang="en-US" dirty="0" smtClean="0"/>
+              <a:t>Analyze the success rate</a:t>
+            </a:r>
+          </a:p>
+          <a:p>
+            <a:r>
+              <a:rPr lang="en-US" dirty="0" smtClean="0">
+                <a:hlinkClick r:id="rId2"/>
+              </a:rPr>
+              <a:t>Research paper t study and implement to solve our case study</a:t>
+            </a:r>
+            <a:endParaRPr lang="en-US" dirty="0" smtClean="0"/>
+          </a:p>
+          <a:p>
+            <a:r>
+              <a:rPr lang="en-US" dirty="0" smtClean="0"/>
+              <a:t>Explaining </a:t>
+            </a:r>
+            <a:r>
+              <a:rPr lang="en-US" dirty="0"/>
+              <a:t>machine learning models in sales predictions</a:t>
+            </a:r>
+            <a:endParaRPr lang="en-US" dirty="0"/>
+          </a:p>
+        </p:txBody>
+      </p:sp>
+      <p:sp>
+        <p:nvSpPr>
+          <p:cNvPr id="4" name="Footer Placeholder 3"/>
+          <p:cNvSpPr>
+            <a:spLocks noGrp="1"/>
+          </p:cNvSpPr>
+          <p:nvPr>
+            <p:ph type="ftr" sz="quarter" idx="11"/>
+          </p:nvPr>
+        </p:nvSpPr>
+        <p:spPr/>
+        <p:txBody>
+          <a:bodyPr/>
+          <a:lstStyle/>
+          <a:p>
+            <a:r>
+              <a:rPr lang="en-US" smtClean="0"/>
+              <a:t>(c) Pratik Shirbhate- Big data and data Science</a:t>
+            </a:r>
+            <a:endParaRPr lang="en-US"/>
+          </a:p>
+        </p:txBody>
+      </p:sp>
+      <p:sp>
+        <p:nvSpPr>
+          <p:cNvPr id="5" name="Slide Number Placeholder 4"/>
+          <p:cNvSpPr>
+            <a:spLocks noGrp="1"/>
+          </p:cNvSpPr>
+          <p:nvPr>
+            <p:ph type="sldNum" sz="quarter" idx="12"/>
+          </p:nvPr>
+        </p:nvSpPr>
+        <p:spPr/>
+        <p:txBody>
+          <a:bodyPr/>
+          <a:lstStyle/>
+          <a:p>
+            <a:fld id="{8CDFFFFD-3B3E-4576-A5F0-2FC5AA489A90}" type="slidenum">
+              <a:rPr lang="en-US" smtClean="0"/>
+              <a:t>14</a:t>
+            </a:fld>
+            <a:endParaRPr lang="en-US"/>
+          </a:p>
+        </p:txBody>
+      </p:sp>
+    </p:spTree>
+    <p:extLst>
+      <p:ext uri="{BB962C8B-B14F-4D97-AF65-F5344CB8AC3E}">
+        <p14:creationId xmlns:p14="http://schemas.microsoft.com/office/powerpoint/2010/main" val="3244001641"/>
+      </p:ext>
+    </p:extLst>
+  </p:cSld>
+  <p:clrMapOvr>
+    <a:masterClrMapping/>
+  </p:clrMapOvr>
+</p:sld>
+</file>
+
+<file path=ppt/slides/slide15.xml><?xml version="1.0" encoding="utf-8"?>
+<p:sld xmlns:a="http://schemas.openxmlformats.org/drawingml/2006/main" xmlns:r="http://schemas.openxmlformats.org/officeDocument/2006/relationships" xmlns:p="http://schemas.openxmlformats.org/presentationml/2006/main">
+  <p:cSld>
+    <p:spTree>
+      <p:nvGrpSpPr>
+        <p:cNvPr id="1" name=""/>
+        <p:cNvGrpSpPr/>
+        <p:nvPr/>
+      </p:nvGrpSpPr>
+      <p:grpSpPr>
+        <a:xfrm>
+          <a:off x="0" y="0"/>
+          <a:ext cx="0" cy="0"/>
+          <a:chOff x="0" y="0"/>
+          <a:chExt cx="0" cy="0"/>
+        </a:xfrm>
+      </p:grpSpPr>
+      <p:sp>
+        <p:nvSpPr>
+          <p:cNvPr id="2" name="Title 1"/>
+          <p:cNvSpPr>
+            <a:spLocks noGrp="1"/>
+          </p:cNvSpPr>
+          <p:nvPr>
+            <p:ph type="title"/>
           </p:nvPr>
         </p:nvSpPr>
         <p:spPr/>
@@ -7750,6 +8223,324 @@
           </a:bodyPr>
           <a:lstStyle/>
           <a:p>
+            <a:r>
+              <a:rPr lang="en-US" dirty="0" smtClean="0"/>
+              <a:t>Use Case 6- Market Segmentation</a:t>
+            </a:r>
+            <a:endParaRPr lang="en-US" dirty="0"/>
+          </a:p>
+        </p:txBody>
+      </p:sp>
+      <p:sp>
+        <p:nvSpPr>
+          <p:cNvPr id="3" name="Content Placeholder 2"/>
+          <p:cNvSpPr>
+            <a:spLocks noGrp="1"/>
+          </p:cNvSpPr>
+          <p:nvPr>
+            <p:ph idx="1"/>
+          </p:nvPr>
+        </p:nvSpPr>
+        <p:spPr/>
+        <p:txBody>
+          <a:bodyPr/>
+          <a:lstStyle/>
+          <a:p>
+            <a:r>
+              <a:rPr lang="en-US" dirty="0" smtClean="0"/>
+              <a:t>Cluster sales of various medical plans </a:t>
+            </a:r>
+            <a:r>
+              <a:rPr lang="en-US" dirty="0" smtClean="0"/>
+              <a:t>demographically</a:t>
+            </a:r>
+          </a:p>
+          <a:p>
+            <a:r>
+              <a:rPr lang="en-US" dirty="0" smtClean="0"/>
+              <a:t>Research Papers</a:t>
+            </a:r>
+          </a:p>
+          <a:p>
+            <a:r>
+              <a:rPr lang="en-US" dirty="0">
+                <a:hlinkClick r:id="rId2"/>
+              </a:rPr>
+              <a:t>A New Approach to Segmentation for the Changing Insurance </a:t>
+            </a:r>
+            <a:r>
+              <a:rPr lang="en-US" dirty="0" smtClean="0">
+                <a:hlinkClick r:id="rId2"/>
+              </a:rPr>
+              <a:t>Industry</a:t>
+            </a:r>
+            <a:endParaRPr lang="en-US" dirty="0" smtClean="0"/>
+          </a:p>
+          <a:p>
+            <a:r>
+              <a:rPr lang="en-US" dirty="0">
+                <a:hlinkClick r:id="rId3"/>
+              </a:rPr>
+              <a:t>Why Health Insurance Companies Should Use Psychographic Segmentation in 2018</a:t>
+            </a:r>
+            <a:endParaRPr lang="en-US" dirty="0"/>
+          </a:p>
+        </p:txBody>
+      </p:sp>
+      <p:sp>
+        <p:nvSpPr>
+          <p:cNvPr id="4" name="Footer Placeholder 3"/>
+          <p:cNvSpPr>
+            <a:spLocks noGrp="1"/>
+          </p:cNvSpPr>
+          <p:nvPr>
+            <p:ph type="ftr" sz="quarter" idx="11"/>
+          </p:nvPr>
+        </p:nvSpPr>
+        <p:spPr/>
+        <p:txBody>
+          <a:bodyPr/>
+          <a:lstStyle/>
+          <a:p>
+            <a:r>
+              <a:rPr lang="en-US" smtClean="0"/>
+              <a:t>(c) Pratik Shirbhate- Big data and data Science</a:t>
+            </a:r>
+            <a:endParaRPr lang="en-US"/>
+          </a:p>
+        </p:txBody>
+      </p:sp>
+      <p:sp>
+        <p:nvSpPr>
+          <p:cNvPr id="5" name="Slide Number Placeholder 4"/>
+          <p:cNvSpPr>
+            <a:spLocks noGrp="1"/>
+          </p:cNvSpPr>
+          <p:nvPr>
+            <p:ph type="sldNum" sz="quarter" idx="12"/>
+          </p:nvPr>
+        </p:nvSpPr>
+        <p:spPr/>
+        <p:txBody>
+          <a:bodyPr/>
+          <a:lstStyle/>
+          <a:p>
+            <a:fld id="{8CDFFFFD-3B3E-4576-A5F0-2FC5AA489A90}" type="slidenum">
+              <a:rPr lang="en-US" smtClean="0"/>
+              <a:t>15</a:t>
+            </a:fld>
+            <a:endParaRPr lang="en-US"/>
+          </a:p>
+        </p:txBody>
+      </p:sp>
+    </p:spTree>
+    <p:extLst>
+      <p:ext uri="{BB962C8B-B14F-4D97-AF65-F5344CB8AC3E}">
+        <p14:creationId xmlns:p14="http://schemas.microsoft.com/office/powerpoint/2010/main" val="820873880"/>
+      </p:ext>
+    </p:extLst>
+  </p:cSld>
+  <p:clrMapOvr>
+    <a:masterClrMapping/>
+  </p:clrMapOvr>
+</p:sld>
+</file>
+
+<file path=ppt/slides/slide16.xml><?xml version="1.0" encoding="utf-8"?>
+<p:sld xmlns:a="http://schemas.openxmlformats.org/drawingml/2006/main" xmlns:r="http://schemas.openxmlformats.org/officeDocument/2006/relationships" xmlns:p="http://schemas.openxmlformats.org/presentationml/2006/main">
+  <p:cSld>
+    <p:spTree>
+      <p:nvGrpSpPr>
+        <p:cNvPr id="1" name=""/>
+        <p:cNvGrpSpPr/>
+        <p:nvPr/>
+      </p:nvGrpSpPr>
+      <p:grpSpPr>
+        <a:xfrm>
+          <a:off x="0" y="0"/>
+          <a:ext cx="0" cy="0"/>
+          <a:chOff x="0" y="0"/>
+          <a:chExt cx="0" cy="0"/>
+        </a:xfrm>
+      </p:grpSpPr>
+      <p:sp>
+        <p:nvSpPr>
+          <p:cNvPr id="2" name="Title 1"/>
+          <p:cNvSpPr>
+            <a:spLocks noGrp="1"/>
+          </p:cNvSpPr>
+          <p:nvPr>
+            <p:ph type="title"/>
+          </p:nvPr>
+        </p:nvSpPr>
+        <p:spPr/>
+        <p:txBody>
+          <a:bodyPr>
+            <a:normAutofit fontScale="90000"/>
+          </a:bodyPr>
+          <a:lstStyle/>
+          <a:p>
+            <a:r>
+              <a:rPr lang="en-US" sz="3600" b="1" dirty="0"/>
+              <a:t>15 AI Applications / </a:t>
+            </a:r>
+            <a:r>
+              <a:rPr lang="en-US" sz="3600" b="1" dirty="0" err="1"/>
+              <a:t>Usecases</a:t>
+            </a:r>
+            <a:r>
+              <a:rPr lang="en-US" sz="3600" b="1" dirty="0"/>
+              <a:t> in Healthcare [2018 update</a:t>
+            </a:r>
+            <a:r>
+              <a:rPr lang="en-US" sz="3600" b="1" dirty="0" smtClean="0"/>
+              <a:t>]</a:t>
+            </a:r>
+            <a:r>
+              <a:rPr lang="en-US" sz="3600" b="1" dirty="0"/>
+              <a:t/>
+            </a:r>
+            <a:br>
+              <a:rPr lang="en-US" sz="3600" b="1" dirty="0"/>
+            </a:br>
+            <a:r>
+              <a:rPr lang="en-US" sz="1700" b="1" dirty="0"/>
+              <a:t>Source-https://blog.appliedai.com/healthcare-</a:t>
+            </a:r>
+            <a:r>
+              <a:rPr lang="en-US" sz="1700" b="1" dirty="0" err="1"/>
+              <a:t>ai</a:t>
+            </a:r>
+            <a:r>
+              <a:rPr lang="en-US" sz="1700" b="1" dirty="0"/>
+              <a:t>/</a:t>
+            </a:r>
+            <a:endParaRPr lang="en-US" sz="1700" dirty="0"/>
+          </a:p>
+        </p:txBody>
+      </p:sp>
+      <p:pic>
+        <p:nvPicPr>
+          <p:cNvPr id="6" name="Content Placeholder 5"/>
+          <p:cNvPicPr>
+            <a:picLocks noGrp="1" noChangeAspect="1"/>
+          </p:cNvPicPr>
+          <p:nvPr>
+            <p:ph idx="1"/>
+          </p:nvPr>
+        </p:nvPicPr>
+        <p:blipFill>
+          <a:blip r:embed="rId2" cstate="print">
+            <a:extLst>
+              <a:ext uri="{28A0092B-C50C-407E-A947-70E740481C1C}">
+                <a14:useLocalDpi xmlns:a14="http://schemas.microsoft.com/office/drawing/2010/main" val="0"/>
+              </a:ext>
+            </a:extLst>
+          </a:blip>
+          <a:stretch>
+            <a:fillRect/>
+          </a:stretch>
+        </p:blipFill>
+        <p:spPr>
+          <a:xfrm>
+            <a:off x="862979" y="1624012"/>
+            <a:ext cx="7418042" cy="4525963"/>
+          </a:xfrm>
+        </p:spPr>
+      </p:pic>
+      <p:sp>
+        <p:nvSpPr>
+          <p:cNvPr id="4" name="Footer Placeholder 3"/>
+          <p:cNvSpPr>
+            <a:spLocks noGrp="1"/>
+          </p:cNvSpPr>
+          <p:nvPr>
+            <p:ph type="ftr" sz="quarter" idx="11"/>
+          </p:nvPr>
+        </p:nvSpPr>
+        <p:spPr/>
+        <p:txBody>
+          <a:bodyPr/>
+          <a:lstStyle/>
+          <a:p>
+            <a:r>
+              <a:rPr lang="en-US" smtClean="0"/>
+              <a:t>(c) Pratik Shirbhate- Big data and data Science</a:t>
+            </a:r>
+            <a:endParaRPr lang="en-US"/>
+          </a:p>
+        </p:txBody>
+      </p:sp>
+      <p:sp>
+        <p:nvSpPr>
+          <p:cNvPr id="5" name="Slide Number Placeholder 4"/>
+          <p:cNvSpPr>
+            <a:spLocks noGrp="1"/>
+          </p:cNvSpPr>
+          <p:nvPr>
+            <p:ph type="sldNum" sz="quarter" idx="12"/>
+          </p:nvPr>
+        </p:nvSpPr>
+        <p:spPr/>
+        <p:txBody>
+          <a:bodyPr/>
+          <a:lstStyle/>
+          <a:p>
+            <a:fld id="{8CDFFFFD-3B3E-4576-A5F0-2FC5AA489A90}" type="slidenum">
+              <a:rPr lang="en-US" smtClean="0"/>
+              <a:t>16</a:t>
+            </a:fld>
+            <a:endParaRPr lang="en-US"/>
+          </a:p>
+        </p:txBody>
+      </p:sp>
+    </p:spTree>
+    <p:extLst>
+      <p:ext uri="{BB962C8B-B14F-4D97-AF65-F5344CB8AC3E}">
+        <p14:creationId xmlns:p14="http://schemas.microsoft.com/office/powerpoint/2010/main" val="2022144738"/>
+      </p:ext>
+    </p:extLst>
+  </p:cSld>
+  <p:clrMapOvr>
+    <a:masterClrMapping/>
+  </p:clrMapOvr>
+</p:sld>
+</file>
+
+<file path=ppt/slides/slide17.xml><?xml version="1.0" encoding="utf-8"?>
+<p:sld xmlns:a="http://schemas.openxmlformats.org/drawingml/2006/main" xmlns:r="http://schemas.openxmlformats.org/officeDocument/2006/relationships" xmlns:p="http://schemas.openxmlformats.org/presentationml/2006/main">
+  <p:cSld>
+    <p:spTree>
+      <p:nvGrpSpPr>
+        <p:cNvPr id="1" name=""/>
+        <p:cNvGrpSpPr/>
+        <p:nvPr/>
+      </p:nvGrpSpPr>
+      <p:grpSpPr>
+        <a:xfrm>
+          <a:off x="0" y="0"/>
+          <a:ext cx="0" cy="0"/>
+          <a:chOff x="0" y="0"/>
+          <a:chExt cx="0" cy="0"/>
+        </a:xfrm>
+      </p:grpSpPr>
+      <p:sp>
+        <p:nvSpPr>
+          <p:cNvPr id="3" name="Content Placeholder 2"/>
+          <p:cNvSpPr>
+            <a:spLocks noGrp="1"/>
+          </p:cNvSpPr>
+          <p:nvPr>
+            <p:ph idx="1"/>
+          </p:nvPr>
+        </p:nvSpPr>
+        <p:spPr/>
+        <p:txBody>
+          <a:bodyPr>
+            <a:normAutofit/>
+          </a:bodyPr>
+          <a:lstStyle/>
+          <a:p>
             <a:pPr marL="0" indent="0" algn="ctr">
               <a:buNone/>
             </a:pPr>
@@ -7807,7 +8598,7 @@
           <a:p>
             <a:fld id="{8CDFFFFD-3B3E-4576-A5F0-2FC5AA489A90}" type="slidenum">
               <a:rPr lang="en-US" smtClean="0"/>
-              <a:t>13</a:t>
+              <a:t>17</a:t>
             </a:fld>
             <a:endParaRPr lang="en-US"/>
           </a:p>
@@ -10677,9 +11468,82 @@
         </p:nvSpPr>
         <p:spPr/>
         <p:txBody>
-          <a:bodyPr/>
-          <a:lstStyle/>
-          <a:p>
+          <a:bodyPr>
+            <a:normAutofit fontScale="77500" lnSpcReduction="20000"/>
+          </a:bodyPr>
+          <a:lstStyle/>
+          <a:p>
+            <a:r>
+              <a:rPr lang="en-US" dirty="0" smtClean="0">
+                <a:hlinkClick r:id="rId2"/>
+              </a:rPr>
+              <a:t>IEEE Paper</a:t>
+            </a:r>
+            <a:endParaRPr lang="en-US" dirty="0" smtClean="0"/>
+          </a:p>
+          <a:p>
+            <a:r>
+              <a:rPr lang="en-US" dirty="0"/>
+              <a:t>According to a recent survey, it is estimated that the number of false claims in the industry is approximately 15 per cent of total </a:t>
+            </a:r>
+            <a:r>
+              <a:rPr lang="en-US" dirty="0" smtClean="0"/>
+              <a:t>claims</a:t>
+            </a:r>
+            <a:endParaRPr lang="en-US" dirty="0"/>
+          </a:p>
+          <a:p>
+            <a:r>
+              <a:rPr lang="en-US" dirty="0"/>
+              <a:t>Insurance companies in USA incur losses over 30 billion USD annually to healthcare insurance </a:t>
+            </a:r>
+            <a:r>
+              <a:rPr lang="en-US" dirty="0" smtClean="0"/>
+              <a:t>frauds</a:t>
+            </a:r>
+          </a:p>
+          <a:p>
+            <a:r>
+              <a:rPr lang="en-US" dirty="0"/>
+              <a:t>H</a:t>
+            </a:r>
+            <a:r>
+              <a:rPr lang="en-US" dirty="0" smtClean="0"/>
+              <a:t>ealthcare </a:t>
+            </a:r>
+            <a:r>
+              <a:rPr lang="en-US" dirty="0"/>
+              <a:t>frauds are not obvious and thus difficult to </a:t>
+            </a:r>
+            <a:r>
+              <a:rPr lang="en-US" dirty="0" smtClean="0"/>
+              <a:t>detect-</a:t>
+            </a:r>
+            <a:r>
+              <a:rPr lang="en-US" dirty="0" smtClean="0">
+                <a:sym typeface="Wingdings" panose="05000000000000000000" pitchFamily="2" charset="2"/>
+              </a:rPr>
+              <a:t> Anomaly Detection</a:t>
+            </a:r>
+            <a:endParaRPr lang="en-US" dirty="0" smtClean="0"/>
+          </a:p>
+          <a:p>
+            <a:r>
+              <a:rPr lang="en-US" dirty="0" smtClean="0"/>
+              <a:t>Don’t have access to read full text</a:t>
+            </a:r>
+          </a:p>
+          <a:p>
+            <a:r>
+              <a:rPr lang="en-US" dirty="0" smtClean="0"/>
+              <a:t>Don’t have data</a:t>
+            </a:r>
+          </a:p>
+          <a:p>
+            <a:r>
+              <a:rPr lang="en-US" dirty="0" smtClean="0"/>
+              <a:t>Get paid access to IEEE in order to get access to all paper</a:t>
+            </a:r>
             <a:endParaRPr lang="en-US" dirty="0"/>
           </a:p>
         </p:txBody>
@@ -10773,32 +11637,272 @@
         <p:spPr/>
         <p:txBody>
           <a:bodyPr>
-            <a:normAutofit/>
+            <a:normAutofit fontScale="90000"/>
           </a:bodyPr>
           <a:lstStyle/>
           <a:p>
             <a:r>
+              <a:rPr lang="en-US" dirty="0"/>
+              <a:t>Examples of healthcare fraud by health care providers and patients</a:t>
+            </a:r>
+          </a:p>
+        </p:txBody>
+      </p:sp>
+      <p:sp>
+        <p:nvSpPr>
+          <p:cNvPr id="3" name="Content Placeholder 2"/>
+          <p:cNvSpPr>
+            <a:spLocks noGrp="1"/>
+          </p:cNvSpPr>
+          <p:nvPr>
+            <p:ph idx="1"/>
+          </p:nvPr>
+        </p:nvSpPr>
+        <p:spPr/>
+        <p:txBody>
+          <a:bodyPr>
+            <a:normAutofit fontScale="70000" lnSpcReduction="20000"/>
+          </a:bodyPr>
+          <a:lstStyle/>
+          <a:p>
+            <a:r>
               <a:rPr lang="en-US" dirty="0" smtClean="0"/>
-              <a:t>Use Case 4- Claim Price Prediction</a:t>
+              <a:t>Providers:</a:t>
+            </a:r>
+          </a:p>
+          <a:p>
+            <a:pPr marL="857250" lvl="1" indent="-457200">
+              <a:buFont typeface="Wingdings" panose="05000000000000000000" pitchFamily="2" charset="2"/>
+              <a:buChar char="Ø"/>
+            </a:pPr>
+            <a:r>
+              <a:rPr lang="en-US" dirty="0"/>
+              <a:t>B</a:t>
+            </a:r>
+            <a:r>
+              <a:rPr lang="en-US" dirty="0" smtClean="0"/>
+              <a:t>illing </a:t>
+            </a:r>
+            <a:r>
+              <a:rPr lang="en-US" dirty="0"/>
+              <a:t>for services not </a:t>
+            </a:r>
+            <a:r>
+              <a:rPr lang="en-US" dirty="0" smtClean="0"/>
+              <a:t>provided</a:t>
+            </a:r>
+          </a:p>
+          <a:p>
+            <a:pPr lvl="1" indent="-342900">
+              <a:buFont typeface="Wingdings" panose="05000000000000000000" pitchFamily="2" charset="2"/>
+              <a:buChar char="Ø"/>
+            </a:pPr>
+            <a:r>
+              <a:rPr lang="en-US" sz="2500" dirty="0" smtClean="0"/>
+              <a:t>  Administering </a:t>
+            </a:r>
+            <a:r>
+              <a:rPr lang="en-US" sz="2500" dirty="0"/>
+              <a:t>(more) tests and treatments or providing </a:t>
+            </a:r>
+            <a:r>
+              <a:rPr lang="en-US" sz="2500" dirty="0" smtClean="0"/>
+              <a:t>equipment's </a:t>
+            </a:r>
+            <a:r>
+              <a:rPr lang="en-US" sz="2500" dirty="0"/>
+              <a:t>that are </a:t>
+            </a:r>
+            <a:r>
+              <a:rPr lang="en-US" sz="2500" dirty="0" smtClean="0"/>
+              <a:t>   not </a:t>
+            </a:r>
+            <a:r>
+              <a:rPr lang="en-US" sz="2500" dirty="0"/>
+              <a:t>medically </a:t>
+            </a:r>
+            <a:r>
+              <a:rPr lang="en-US" sz="2500" dirty="0" smtClean="0"/>
+              <a:t>necessary</a:t>
+            </a:r>
+            <a:endParaRPr lang="en-US" sz="2500" dirty="0"/>
+          </a:p>
+          <a:p>
+            <a:pPr marL="857250" lvl="1" indent="-457200">
+              <a:buFont typeface="Wingdings" panose="05000000000000000000" pitchFamily="2" charset="2"/>
+              <a:buChar char="Ø"/>
+            </a:pPr>
+            <a:r>
+              <a:rPr lang="en-US" dirty="0"/>
+              <a:t>A</a:t>
+            </a:r>
+            <a:r>
+              <a:rPr lang="en-US" dirty="0" smtClean="0"/>
+              <a:t>dministering </a:t>
+            </a:r>
+            <a:r>
+              <a:rPr lang="en-US" dirty="0"/>
+              <a:t>more expensive tests and </a:t>
+            </a:r>
+            <a:r>
+              <a:rPr lang="en-US" dirty="0" smtClean="0"/>
+              <a:t>equipment's </a:t>
+            </a:r>
+            <a:r>
+              <a:rPr lang="en-US" dirty="0"/>
+              <a:t>(up-coding</a:t>
+            </a:r>
+            <a:r>
+              <a:rPr lang="en-US" dirty="0" smtClean="0"/>
+              <a:t>)</a:t>
             </a:r>
             <a:endParaRPr lang="en-US" dirty="0"/>
           </a:p>
-        </p:txBody>
-      </p:sp>
-      <p:sp>
-        <p:nvSpPr>
-          <p:cNvPr id="3" name="Content Placeholder 2"/>
-          <p:cNvSpPr>
-            <a:spLocks noGrp="1"/>
-          </p:cNvSpPr>
-          <p:nvPr>
-            <p:ph idx="1"/>
-          </p:nvPr>
-        </p:nvSpPr>
-        <p:spPr/>
-        <p:txBody>
-          <a:bodyPr/>
-          <a:lstStyle/>
+          <a:p>
+            <a:pPr marL="857250" lvl="1" indent="-457200">
+              <a:buFont typeface="Wingdings" panose="05000000000000000000" pitchFamily="2" charset="2"/>
+              <a:buChar char="Ø"/>
+            </a:pPr>
+            <a:r>
+              <a:rPr lang="en-US" dirty="0"/>
+              <a:t>M</a:t>
+            </a:r>
+            <a:r>
+              <a:rPr lang="en-US" dirty="0" smtClean="0"/>
+              <a:t>ultiple-billing </a:t>
+            </a:r>
+            <a:r>
+              <a:rPr lang="en-US" dirty="0"/>
+              <a:t>for services </a:t>
+            </a:r>
+            <a:r>
+              <a:rPr lang="en-US" dirty="0" smtClean="0"/>
+              <a:t>rendered</a:t>
+            </a:r>
+            <a:endParaRPr lang="en-US" dirty="0"/>
+          </a:p>
+          <a:p>
+            <a:pPr marL="857250" lvl="1" indent="-457200">
+              <a:buFont typeface="Wingdings" panose="05000000000000000000" pitchFamily="2" charset="2"/>
+              <a:buChar char="Ø"/>
+            </a:pPr>
+            <a:r>
+              <a:rPr lang="en-US" dirty="0"/>
+              <a:t>U</a:t>
+            </a:r>
+            <a:r>
+              <a:rPr lang="en-US" dirty="0" smtClean="0"/>
+              <a:t>nbundling </a:t>
+            </a:r>
+            <a:r>
+              <a:rPr lang="en-US" dirty="0"/>
+              <a:t>or billing separately for laboratory tests performed together to get higher </a:t>
+            </a:r>
+            <a:r>
+              <a:rPr lang="en-US" dirty="0" smtClean="0"/>
+              <a:t>reimbursements</a:t>
+            </a:r>
+            <a:endParaRPr lang="en-US" dirty="0"/>
+          </a:p>
+          <a:p>
+            <a:pPr marL="857250" lvl="1" indent="-457200">
+              <a:buFont typeface="Wingdings" panose="05000000000000000000" pitchFamily="2" charset="2"/>
+              <a:buChar char="Ø"/>
+            </a:pPr>
+            <a:r>
+              <a:rPr lang="en-US" dirty="0"/>
+              <a:t>C</a:t>
+            </a:r>
+            <a:r>
+              <a:rPr lang="en-US" dirty="0" smtClean="0"/>
+              <a:t>harging </a:t>
+            </a:r>
+            <a:r>
+              <a:rPr lang="en-US" dirty="0"/>
+              <a:t>more than peers for the same </a:t>
+            </a:r>
+            <a:r>
+              <a:rPr lang="en-US" dirty="0" smtClean="0"/>
+              <a:t>services</a:t>
+            </a:r>
+            <a:endParaRPr lang="en-US" dirty="0"/>
+          </a:p>
+          <a:p>
+            <a:pPr marL="857250" lvl="1" indent="-457200">
+              <a:buFont typeface="Wingdings" panose="05000000000000000000" pitchFamily="2" charset="2"/>
+              <a:buChar char="Ø"/>
+            </a:pPr>
+            <a:r>
+              <a:rPr lang="en-US" dirty="0"/>
+              <a:t>C</a:t>
+            </a:r>
+            <a:r>
+              <a:rPr lang="en-US" dirty="0" smtClean="0"/>
+              <a:t>onducting </a:t>
+            </a:r>
+            <a:r>
+              <a:rPr lang="en-US" dirty="0"/>
+              <a:t>medically unrelated procedures and </a:t>
+            </a:r>
+            <a:r>
+              <a:rPr lang="en-US" dirty="0" smtClean="0"/>
+              <a:t>services</a:t>
+            </a:r>
+          </a:p>
+          <a:p>
+            <a:pPr marL="400050" lvl="1" indent="0">
+              <a:buNone/>
+            </a:pPr>
+            <a:endParaRPr lang="en-US" dirty="0"/>
+          </a:p>
+          <a:p>
+            <a:r>
+              <a:rPr lang="en-US" dirty="0"/>
+              <a:t>Policy holders </a:t>
+            </a:r>
+            <a:endParaRPr lang="en-US" dirty="0" smtClean="0"/>
+          </a:p>
+          <a:p>
+            <a:pPr marL="857250" lvl="1" indent="-457200">
+              <a:buFont typeface="Wingdings" panose="05000000000000000000" pitchFamily="2" charset="2"/>
+              <a:buChar char="Ø"/>
+            </a:pPr>
+            <a:r>
+              <a:rPr lang="en-US" dirty="0"/>
+              <a:t>T</a:t>
+            </a:r>
+            <a:r>
+              <a:rPr lang="en-US" dirty="0" smtClean="0"/>
+              <a:t>raveling </a:t>
+            </a:r>
+            <a:r>
+              <a:rPr lang="en-US" dirty="0"/>
+              <a:t>long distance for treatment which may be available nearby. (Possibly scams by bogus providers.)</a:t>
+            </a:r>
+          </a:p>
+          <a:p>
+            <a:pPr marL="857250" lvl="1" indent="-457200">
+              <a:buFont typeface="Wingdings" panose="05000000000000000000" pitchFamily="2" charset="2"/>
+              <a:buChar char="Ø"/>
+            </a:pPr>
+            <a:r>
+              <a:rPr lang="en-US" dirty="0"/>
+              <a:t>L</a:t>
+            </a:r>
+            <a:r>
+              <a:rPr lang="en-US" dirty="0" smtClean="0"/>
+              <a:t>etting </a:t>
+            </a:r>
+            <a:r>
+              <a:rPr lang="en-US" dirty="0"/>
+              <a:t>others use their healthcare </a:t>
+            </a:r>
+            <a:r>
+              <a:rPr lang="en-US" dirty="0" smtClean="0"/>
+              <a:t>cards</a:t>
+            </a:r>
+            <a:endParaRPr lang="en-US" dirty="0"/>
+          </a:p>
           <a:p>
             <a:endParaRPr lang="en-US" dirty="0"/>
           </a:p>
@@ -10853,7 +11957,7 @@
     </p:spTree>
     <p:extLst>
       <p:ext uri="{BB962C8B-B14F-4D97-AF65-F5344CB8AC3E}">
-        <p14:creationId xmlns:p14="http://schemas.microsoft.com/office/powerpoint/2010/main" val="1372200419"/>
+        <p14:creationId xmlns:p14="http://schemas.microsoft.com/office/powerpoint/2010/main" val="1399483926"/>
       </p:ext>
     </p:extLst>
   </p:cSld>

</xml_diff>